<commit_message>
Update date on banner image
</commit_message>
<xml_diff>
--- a/ai/img/banner.pptx
+++ b/ai/img/banner.pptx
@@ -243,7 +243,7 @@
           <a:p>
             <a:fld id="{A5D05D46-B358-7A4C-B5BC-04EA20ACD986}" type="datetimeFigureOut">
               <a:rPr lang="en-US" smtClean="0"/>
-              <a:t>11/8/20</a:t>
+              <a:t>10/3/21</a:t>
             </a:fld>
             <a:endParaRPr lang="en-US"/>
           </a:p>
@@ -413,7 +413,7 @@
           <a:p>
             <a:fld id="{A5D05D46-B358-7A4C-B5BC-04EA20ACD986}" type="datetimeFigureOut">
               <a:rPr lang="en-US" smtClean="0"/>
-              <a:t>11/8/20</a:t>
+              <a:t>10/3/21</a:t>
             </a:fld>
             <a:endParaRPr lang="en-US"/>
           </a:p>
@@ -593,7 +593,7 @@
           <a:p>
             <a:fld id="{A5D05D46-B358-7A4C-B5BC-04EA20ACD986}" type="datetimeFigureOut">
               <a:rPr lang="en-US" smtClean="0"/>
-              <a:t>11/8/20</a:t>
+              <a:t>10/3/21</a:t>
             </a:fld>
             <a:endParaRPr lang="en-US"/>
           </a:p>
@@ -763,7 +763,7 @@
           <a:p>
             <a:fld id="{A5D05D46-B358-7A4C-B5BC-04EA20ACD986}" type="datetimeFigureOut">
               <a:rPr lang="en-US" smtClean="0"/>
-              <a:t>11/8/20</a:t>
+              <a:t>10/3/21</a:t>
             </a:fld>
             <a:endParaRPr lang="en-US"/>
           </a:p>
@@ -1009,7 +1009,7 @@
           <a:p>
             <a:fld id="{A5D05D46-B358-7A4C-B5BC-04EA20ACD986}" type="datetimeFigureOut">
               <a:rPr lang="en-US" smtClean="0"/>
-              <a:t>11/8/20</a:t>
+              <a:t>10/3/21</a:t>
             </a:fld>
             <a:endParaRPr lang="en-US"/>
           </a:p>
@@ -1241,7 +1241,7 @@
           <a:p>
             <a:fld id="{A5D05D46-B358-7A4C-B5BC-04EA20ACD986}" type="datetimeFigureOut">
               <a:rPr lang="en-US" smtClean="0"/>
-              <a:t>11/8/20</a:t>
+              <a:t>10/3/21</a:t>
             </a:fld>
             <a:endParaRPr lang="en-US"/>
           </a:p>
@@ -1608,7 +1608,7 @@
           <a:p>
             <a:fld id="{A5D05D46-B358-7A4C-B5BC-04EA20ACD986}" type="datetimeFigureOut">
               <a:rPr lang="en-US" smtClean="0"/>
-              <a:t>11/8/20</a:t>
+              <a:t>10/3/21</a:t>
             </a:fld>
             <a:endParaRPr lang="en-US"/>
           </a:p>
@@ -1726,7 +1726,7 @@
           <a:p>
             <a:fld id="{A5D05D46-B358-7A4C-B5BC-04EA20ACD986}" type="datetimeFigureOut">
               <a:rPr lang="en-US" smtClean="0"/>
-              <a:t>11/8/20</a:t>
+              <a:t>10/3/21</a:t>
             </a:fld>
             <a:endParaRPr lang="en-US"/>
           </a:p>
@@ -1821,7 +1821,7 @@
           <a:p>
             <a:fld id="{A5D05D46-B358-7A4C-B5BC-04EA20ACD986}" type="datetimeFigureOut">
               <a:rPr lang="en-US" smtClean="0"/>
-              <a:t>11/8/20</a:t>
+              <a:t>10/3/21</a:t>
             </a:fld>
             <a:endParaRPr lang="en-US"/>
           </a:p>
@@ -2098,7 +2098,7 @@
           <a:p>
             <a:fld id="{A5D05D46-B358-7A4C-B5BC-04EA20ACD986}" type="datetimeFigureOut">
               <a:rPr lang="en-US" smtClean="0"/>
-              <a:t>11/8/20</a:t>
+              <a:t>10/3/21</a:t>
             </a:fld>
             <a:endParaRPr lang="en-US"/>
           </a:p>
@@ -2355,7 +2355,7 @@
           <a:p>
             <a:fld id="{A5D05D46-B358-7A4C-B5BC-04EA20ACD986}" type="datetimeFigureOut">
               <a:rPr lang="en-US" smtClean="0"/>
-              <a:t>11/8/20</a:t>
+              <a:t>10/3/21</a:t>
             </a:fld>
             <a:endParaRPr lang="en-US"/>
           </a:p>
@@ -2568,7 +2568,7 @@
           <a:p>
             <a:fld id="{A5D05D46-B358-7A4C-B5BC-04EA20ACD986}" type="datetimeFigureOut">
               <a:rPr lang="en-US" smtClean="0"/>
-              <a:t>11/8/20</a:t>
+              <a:t>10/3/21</a:t>
             </a:fld>
             <a:endParaRPr lang="en-US"/>
           </a:p>
@@ -3167,7 +3167,7 @@
               <a:rPr lang="en-US" sz="2400" b="1" dirty="0">
                 <a:latin typeface="Optima" panose="02000503060000020004" pitchFamily="2" charset="0"/>
               </a:rPr>
-              <a:t> 2020-2021:</a:t>
+              <a:t> 2021-2022:</a:t>
             </a:r>
           </a:p>
           <a:p>

</xml_diff>

<commit_message>
Update webpages for 2022-2023 program.
</commit_message>
<xml_diff>
--- a/ai/img/banner.pptx
+++ b/ai/img/banner.pptx
@@ -243,7 +243,7 @@
           <a:p>
             <a:fld id="{A5D05D46-B358-7A4C-B5BC-04EA20ACD986}" type="datetimeFigureOut">
               <a:rPr lang="en-US" smtClean="0"/>
-              <a:t>10/3/21</a:t>
+              <a:t>10/1/22</a:t>
             </a:fld>
             <a:endParaRPr lang="en-US"/>
           </a:p>
@@ -413,7 +413,7 @@
           <a:p>
             <a:fld id="{A5D05D46-B358-7A4C-B5BC-04EA20ACD986}" type="datetimeFigureOut">
               <a:rPr lang="en-US" smtClean="0"/>
-              <a:t>10/3/21</a:t>
+              <a:t>10/1/22</a:t>
             </a:fld>
             <a:endParaRPr lang="en-US"/>
           </a:p>
@@ -593,7 +593,7 @@
           <a:p>
             <a:fld id="{A5D05D46-B358-7A4C-B5BC-04EA20ACD986}" type="datetimeFigureOut">
               <a:rPr lang="en-US" smtClean="0"/>
-              <a:t>10/3/21</a:t>
+              <a:t>10/1/22</a:t>
             </a:fld>
             <a:endParaRPr lang="en-US"/>
           </a:p>
@@ -763,7 +763,7 @@
           <a:p>
             <a:fld id="{A5D05D46-B358-7A4C-B5BC-04EA20ACD986}" type="datetimeFigureOut">
               <a:rPr lang="en-US" smtClean="0"/>
-              <a:t>10/3/21</a:t>
+              <a:t>10/1/22</a:t>
             </a:fld>
             <a:endParaRPr lang="en-US"/>
           </a:p>
@@ -1009,7 +1009,7 @@
           <a:p>
             <a:fld id="{A5D05D46-B358-7A4C-B5BC-04EA20ACD986}" type="datetimeFigureOut">
               <a:rPr lang="en-US" smtClean="0"/>
-              <a:t>10/3/21</a:t>
+              <a:t>10/1/22</a:t>
             </a:fld>
             <a:endParaRPr lang="en-US"/>
           </a:p>
@@ -1241,7 +1241,7 @@
           <a:p>
             <a:fld id="{A5D05D46-B358-7A4C-B5BC-04EA20ACD986}" type="datetimeFigureOut">
               <a:rPr lang="en-US" smtClean="0"/>
-              <a:t>10/3/21</a:t>
+              <a:t>10/1/22</a:t>
             </a:fld>
             <a:endParaRPr lang="en-US"/>
           </a:p>
@@ -1608,7 +1608,7 @@
           <a:p>
             <a:fld id="{A5D05D46-B358-7A4C-B5BC-04EA20ACD986}" type="datetimeFigureOut">
               <a:rPr lang="en-US" smtClean="0"/>
-              <a:t>10/3/21</a:t>
+              <a:t>10/1/22</a:t>
             </a:fld>
             <a:endParaRPr lang="en-US"/>
           </a:p>
@@ -1726,7 +1726,7 @@
           <a:p>
             <a:fld id="{A5D05D46-B358-7A4C-B5BC-04EA20ACD986}" type="datetimeFigureOut">
               <a:rPr lang="en-US" smtClean="0"/>
-              <a:t>10/3/21</a:t>
+              <a:t>10/1/22</a:t>
             </a:fld>
             <a:endParaRPr lang="en-US"/>
           </a:p>
@@ -1821,7 +1821,7 @@
           <a:p>
             <a:fld id="{A5D05D46-B358-7A4C-B5BC-04EA20ACD986}" type="datetimeFigureOut">
               <a:rPr lang="en-US" smtClean="0"/>
-              <a:t>10/3/21</a:t>
+              <a:t>10/1/22</a:t>
             </a:fld>
             <a:endParaRPr lang="en-US"/>
           </a:p>
@@ -2098,7 +2098,7 @@
           <a:p>
             <a:fld id="{A5D05D46-B358-7A4C-B5BC-04EA20ACD986}" type="datetimeFigureOut">
               <a:rPr lang="en-US" smtClean="0"/>
-              <a:t>10/3/21</a:t>
+              <a:t>10/1/22</a:t>
             </a:fld>
             <a:endParaRPr lang="en-US"/>
           </a:p>
@@ -2355,7 +2355,7 @@
           <a:p>
             <a:fld id="{A5D05D46-B358-7A4C-B5BC-04EA20ACD986}" type="datetimeFigureOut">
               <a:rPr lang="en-US" smtClean="0"/>
-              <a:t>10/3/21</a:t>
+              <a:t>10/1/22</a:t>
             </a:fld>
             <a:endParaRPr lang="en-US"/>
           </a:p>
@@ -2568,7 +2568,7 @@
           <a:p>
             <a:fld id="{A5D05D46-B358-7A4C-B5BC-04EA20ACD986}" type="datetimeFigureOut">
               <a:rPr lang="en-US" smtClean="0"/>
-              <a:t>10/3/21</a:t>
+              <a:t>10/1/22</a:t>
             </a:fld>
             <a:endParaRPr lang="en-US"/>
           </a:p>
@@ -3167,7 +3167,7 @@
               <a:rPr lang="en-US" sz="2400" b="1" dirty="0">
                 <a:latin typeface="Optima" panose="02000503060000020004" pitchFamily="2" charset="0"/>
               </a:rPr>
-              <a:t> 2021-2022:</a:t>
+              <a:t> 2022-2023:</a:t>
             </a:r>
           </a:p>
           <a:p>

</xml_diff>

<commit_message>
Update AI page for 2024.
</commit_message>
<xml_diff>
--- a/ai/img/banner.pptx
+++ b/ai/img/banner.pptx
@@ -243,7 +243,7 @@
           <a:p>
             <a:fld id="{A5D05D46-B358-7A4C-B5BC-04EA20ACD986}" type="datetimeFigureOut">
               <a:rPr lang="en-US" smtClean="0"/>
-              <a:t>10/1/22</a:t>
+              <a:t>10/8/23</a:t>
             </a:fld>
             <a:endParaRPr lang="en-US"/>
           </a:p>
@@ -413,7 +413,7 @@
           <a:p>
             <a:fld id="{A5D05D46-B358-7A4C-B5BC-04EA20ACD986}" type="datetimeFigureOut">
               <a:rPr lang="en-US" smtClean="0"/>
-              <a:t>10/1/22</a:t>
+              <a:t>10/8/23</a:t>
             </a:fld>
             <a:endParaRPr lang="en-US"/>
           </a:p>
@@ -593,7 +593,7 @@
           <a:p>
             <a:fld id="{A5D05D46-B358-7A4C-B5BC-04EA20ACD986}" type="datetimeFigureOut">
               <a:rPr lang="en-US" smtClean="0"/>
-              <a:t>10/1/22</a:t>
+              <a:t>10/8/23</a:t>
             </a:fld>
             <a:endParaRPr lang="en-US"/>
           </a:p>
@@ -763,7 +763,7 @@
           <a:p>
             <a:fld id="{A5D05D46-B358-7A4C-B5BC-04EA20ACD986}" type="datetimeFigureOut">
               <a:rPr lang="en-US" smtClean="0"/>
-              <a:t>10/1/22</a:t>
+              <a:t>10/8/23</a:t>
             </a:fld>
             <a:endParaRPr lang="en-US"/>
           </a:p>
@@ -1009,7 +1009,7 @@
           <a:p>
             <a:fld id="{A5D05D46-B358-7A4C-B5BC-04EA20ACD986}" type="datetimeFigureOut">
               <a:rPr lang="en-US" smtClean="0"/>
-              <a:t>10/1/22</a:t>
+              <a:t>10/8/23</a:t>
             </a:fld>
             <a:endParaRPr lang="en-US"/>
           </a:p>
@@ -1241,7 +1241,7 @@
           <a:p>
             <a:fld id="{A5D05D46-B358-7A4C-B5BC-04EA20ACD986}" type="datetimeFigureOut">
               <a:rPr lang="en-US" smtClean="0"/>
-              <a:t>10/1/22</a:t>
+              <a:t>10/8/23</a:t>
             </a:fld>
             <a:endParaRPr lang="en-US"/>
           </a:p>
@@ -1608,7 +1608,7 @@
           <a:p>
             <a:fld id="{A5D05D46-B358-7A4C-B5BC-04EA20ACD986}" type="datetimeFigureOut">
               <a:rPr lang="en-US" smtClean="0"/>
-              <a:t>10/1/22</a:t>
+              <a:t>10/8/23</a:t>
             </a:fld>
             <a:endParaRPr lang="en-US"/>
           </a:p>
@@ -1726,7 +1726,7 @@
           <a:p>
             <a:fld id="{A5D05D46-B358-7A4C-B5BC-04EA20ACD986}" type="datetimeFigureOut">
               <a:rPr lang="en-US" smtClean="0"/>
-              <a:t>10/1/22</a:t>
+              <a:t>10/8/23</a:t>
             </a:fld>
             <a:endParaRPr lang="en-US"/>
           </a:p>
@@ -1821,7 +1821,7 @@
           <a:p>
             <a:fld id="{A5D05D46-B358-7A4C-B5BC-04EA20ACD986}" type="datetimeFigureOut">
               <a:rPr lang="en-US" smtClean="0"/>
-              <a:t>10/1/22</a:t>
+              <a:t>10/8/23</a:t>
             </a:fld>
             <a:endParaRPr lang="en-US"/>
           </a:p>
@@ -2098,7 +2098,7 @@
           <a:p>
             <a:fld id="{A5D05D46-B358-7A4C-B5BC-04EA20ACD986}" type="datetimeFigureOut">
               <a:rPr lang="en-US" smtClean="0"/>
-              <a:t>10/1/22</a:t>
+              <a:t>10/8/23</a:t>
             </a:fld>
             <a:endParaRPr lang="en-US"/>
           </a:p>
@@ -2355,7 +2355,7 @@
           <a:p>
             <a:fld id="{A5D05D46-B358-7A4C-B5BC-04EA20ACD986}" type="datetimeFigureOut">
               <a:rPr lang="en-US" smtClean="0"/>
-              <a:t>10/1/22</a:t>
+              <a:t>10/8/23</a:t>
             </a:fld>
             <a:endParaRPr lang="en-US"/>
           </a:p>
@@ -2568,7 +2568,7 @@
           <a:p>
             <a:fld id="{A5D05D46-B358-7A4C-B5BC-04EA20ACD986}" type="datetimeFigureOut">
               <a:rPr lang="en-US" smtClean="0"/>
-              <a:t>10/1/22</a:t>
+              <a:t>10/8/23</a:t>
             </a:fld>
             <a:endParaRPr lang="en-US"/>
           </a:p>
@@ -3142,8 +3142,8 @@
         </p:nvSpPr>
         <p:spPr>
           <a:xfrm>
-            <a:off x="-73053" y="914402"/>
-            <a:ext cx="7123168" cy="830997"/>
+            <a:off x="617494" y="914402"/>
+            <a:ext cx="5742085" cy="830997"/>
           </a:xfrm>
           <a:prstGeom prst="rect">
             <a:avLst/>
@@ -3167,7 +3167,7 @@
               <a:rPr lang="en-US" sz="2400" b="1" dirty="0">
                 <a:latin typeface="Optima" panose="02000503060000020004" pitchFamily="2" charset="0"/>
               </a:rPr>
-              <a:t> 2022-2023:</a:t>
+              <a:t> 2024:</a:t>
             </a:r>
           </a:p>
           <a:p>
@@ -3176,7 +3176,7 @@
               <a:rPr lang="en-US" sz="2400" dirty="0">
                 <a:latin typeface="Optima" panose="02000503060000020004" pitchFamily="2" charset="0"/>
               </a:rPr>
-              <a:t>Socially-Responsible AI for Computational Creativity</a:t>
+              <a:t>Socially-Responsible Artificial Intelligence</a:t>
             </a:r>
           </a:p>
         </p:txBody>

</xml_diff>

<commit_message>
Initial changes for 2025.
</commit_message>
<xml_diff>
--- a/ai/img/banner.pptx
+++ b/ai/img/banner.pptx
@@ -243,7 +243,7 @@
           <a:p>
             <a:fld id="{A5D05D46-B358-7A4C-B5BC-04EA20ACD986}" type="datetimeFigureOut">
               <a:rPr lang="en-US" smtClean="0"/>
-              <a:t>10/8/23</a:t>
+              <a:t>10/6/24</a:t>
             </a:fld>
             <a:endParaRPr lang="en-US"/>
           </a:p>
@@ -413,7 +413,7 @@
           <a:p>
             <a:fld id="{A5D05D46-B358-7A4C-B5BC-04EA20ACD986}" type="datetimeFigureOut">
               <a:rPr lang="en-US" smtClean="0"/>
-              <a:t>10/8/23</a:t>
+              <a:t>10/6/24</a:t>
             </a:fld>
             <a:endParaRPr lang="en-US"/>
           </a:p>
@@ -593,7 +593,7 @@
           <a:p>
             <a:fld id="{A5D05D46-B358-7A4C-B5BC-04EA20ACD986}" type="datetimeFigureOut">
               <a:rPr lang="en-US" smtClean="0"/>
-              <a:t>10/8/23</a:t>
+              <a:t>10/6/24</a:t>
             </a:fld>
             <a:endParaRPr lang="en-US"/>
           </a:p>
@@ -763,7 +763,7 @@
           <a:p>
             <a:fld id="{A5D05D46-B358-7A4C-B5BC-04EA20ACD986}" type="datetimeFigureOut">
               <a:rPr lang="en-US" smtClean="0"/>
-              <a:t>10/8/23</a:t>
+              <a:t>10/6/24</a:t>
             </a:fld>
             <a:endParaRPr lang="en-US"/>
           </a:p>
@@ -1009,7 +1009,7 @@
           <a:p>
             <a:fld id="{A5D05D46-B358-7A4C-B5BC-04EA20ACD986}" type="datetimeFigureOut">
               <a:rPr lang="en-US" smtClean="0"/>
-              <a:t>10/8/23</a:t>
+              <a:t>10/6/24</a:t>
             </a:fld>
             <a:endParaRPr lang="en-US"/>
           </a:p>
@@ -1241,7 +1241,7 @@
           <a:p>
             <a:fld id="{A5D05D46-B358-7A4C-B5BC-04EA20ACD986}" type="datetimeFigureOut">
               <a:rPr lang="en-US" smtClean="0"/>
-              <a:t>10/8/23</a:t>
+              <a:t>10/6/24</a:t>
             </a:fld>
             <a:endParaRPr lang="en-US"/>
           </a:p>
@@ -1608,7 +1608,7 @@
           <a:p>
             <a:fld id="{A5D05D46-B358-7A4C-B5BC-04EA20ACD986}" type="datetimeFigureOut">
               <a:rPr lang="en-US" smtClean="0"/>
-              <a:t>10/8/23</a:t>
+              <a:t>10/6/24</a:t>
             </a:fld>
             <a:endParaRPr lang="en-US"/>
           </a:p>
@@ -1726,7 +1726,7 @@
           <a:p>
             <a:fld id="{A5D05D46-B358-7A4C-B5BC-04EA20ACD986}" type="datetimeFigureOut">
               <a:rPr lang="en-US" smtClean="0"/>
-              <a:t>10/8/23</a:t>
+              <a:t>10/6/24</a:t>
             </a:fld>
             <a:endParaRPr lang="en-US"/>
           </a:p>
@@ -1821,7 +1821,7 @@
           <a:p>
             <a:fld id="{A5D05D46-B358-7A4C-B5BC-04EA20ACD986}" type="datetimeFigureOut">
               <a:rPr lang="en-US" smtClean="0"/>
-              <a:t>10/8/23</a:t>
+              <a:t>10/6/24</a:t>
             </a:fld>
             <a:endParaRPr lang="en-US"/>
           </a:p>
@@ -2098,7 +2098,7 @@
           <a:p>
             <a:fld id="{A5D05D46-B358-7A4C-B5BC-04EA20ACD986}" type="datetimeFigureOut">
               <a:rPr lang="en-US" smtClean="0"/>
-              <a:t>10/8/23</a:t>
+              <a:t>10/6/24</a:t>
             </a:fld>
             <a:endParaRPr lang="en-US"/>
           </a:p>
@@ -2355,7 +2355,7 @@
           <a:p>
             <a:fld id="{A5D05D46-B358-7A4C-B5BC-04EA20ACD986}" type="datetimeFigureOut">
               <a:rPr lang="en-US" smtClean="0"/>
-              <a:t>10/8/23</a:t>
+              <a:t>10/6/24</a:t>
             </a:fld>
             <a:endParaRPr lang="en-US"/>
           </a:p>
@@ -2568,7 +2568,7 @@
           <a:p>
             <a:fld id="{A5D05D46-B358-7A4C-B5BC-04EA20ACD986}" type="datetimeFigureOut">
               <a:rPr lang="en-US" smtClean="0"/>
-              <a:t>10/8/23</a:t>
+              <a:t>10/6/24</a:t>
             </a:fld>
             <a:endParaRPr lang="en-US"/>
           </a:p>
@@ -3167,7 +3167,7 @@
               <a:rPr lang="en-US" sz="2400" b="1" dirty="0">
                 <a:latin typeface="Optima" panose="02000503060000020004" pitchFamily="2" charset="0"/>
               </a:rPr>
-              <a:t> 2024:</a:t>
+              <a:t> 2025:</a:t>
             </a:r>
           </a:p>
           <a:p>

</xml_diff>